<commit_message>
updated C cycle diagram based on Helene's & Nobby's feedback
-calculated respiration+fire term
-integrated Helene's numbers
-cosmetic changes
</commit_message>
<xml_diff>
--- a/Global_C_cycle/Global C cycle diagram.pptx
+++ b/Global_C_cycle/Global C cycle diagram.pptx
@@ -197,7 +197,7 @@
           <a:p>
             <a:fld id="{477DAECC-5608-6847-9D1F-233F2AA6E8E0}" type="datetimeFigureOut">
               <a:rPr lang="en-US" smtClean="0"/>
-              <a:t>5/21/18</a:t>
+              <a:t>5/23/18</a:t>
             </a:fld>
             <a:endParaRPr lang="en-US"/>
           </a:p>
@@ -515,13 +515,27 @@
             </a:r>
             <a:r>
               <a:rPr lang="en-US" baseline="0" dirty="0" smtClean="0"/>
-              <a:t> </a:t>
+              <a:t> recent estimates from each </a:t>
+            </a:r>
+            <a:r>
+              <a:rPr lang="en-US" baseline="0" dirty="0" smtClean="0"/>
+              <a:t>source.</a:t>
+            </a:r>
+          </a:p>
+          <a:p>
+            <a:r>
+              <a:rPr lang="en-US" baseline="0" dirty="0" smtClean="0"/>
+              <a:t>Ecosystem respiration + fire are </a:t>
             </a:r>
             <a:r>
               <a:rPr lang="en-US" baseline="0" smtClean="0"/>
-              <a:t>recent estimates from each source</a:t>
-            </a:r>
-            <a:endParaRPr lang="en-US"/>
+              <a:t>my calculations based </a:t>
+            </a:r>
+            <a:r>
+              <a:rPr lang="en-US" baseline="0" dirty="0" smtClean="0"/>
+              <a:t>on change estimate for each biome</a:t>
+            </a:r>
+            <a:endParaRPr lang="en-US" dirty="0"/>
           </a:p>
         </p:txBody>
       </p:sp>
@@ -692,7 +706,7 @@
           <a:p>
             <a:fld id="{2A50713F-BF44-3547-876E-CD7CBBF470C2}" type="datetimeFigureOut">
               <a:rPr lang="en-US" smtClean="0"/>
-              <a:t>5/21/18</a:t>
+              <a:t>5/23/18</a:t>
             </a:fld>
             <a:endParaRPr lang="en-US"/>
           </a:p>
@@ -857,7 +871,7 @@
           <a:p>
             <a:fld id="{2A50713F-BF44-3547-876E-CD7CBBF470C2}" type="datetimeFigureOut">
               <a:rPr lang="en-US" smtClean="0"/>
-              <a:t>5/21/18</a:t>
+              <a:t>5/23/18</a:t>
             </a:fld>
             <a:endParaRPr lang="en-US"/>
           </a:p>
@@ -1032,7 +1046,7 @@
           <a:p>
             <a:fld id="{2A50713F-BF44-3547-876E-CD7CBBF470C2}" type="datetimeFigureOut">
               <a:rPr lang="en-US" smtClean="0"/>
-              <a:t>5/21/18</a:t>
+              <a:t>5/23/18</a:t>
             </a:fld>
             <a:endParaRPr lang="en-US"/>
           </a:p>
@@ -1197,7 +1211,7 @@
           <a:p>
             <a:fld id="{2A50713F-BF44-3547-876E-CD7CBBF470C2}" type="datetimeFigureOut">
               <a:rPr lang="en-US" smtClean="0"/>
-              <a:t>5/21/18</a:t>
+              <a:t>5/23/18</a:t>
             </a:fld>
             <a:endParaRPr lang="en-US"/>
           </a:p>
@@ -1436,7 +1450,7 @@
           <a:p>
             <a:fld id="{2A50713F-BF44-3547-876E-CD7CBBF470C2}" type="datetimeFigureOut">
               <a:rPr lang="en-US" smtClean="0"/>
-              <a:t>5/21/18</a:t>
+              <a:t>5/23/18</a:t>
             </a:fld>
             <a:endParaRPr lang="en-US"/>
           </a:p>
@@ -1663,7 +1677,7 @@
           <a:p>
             <a:fld id="{2A50713F-BF44-3547-876E-CD7CBBF470C2}" type="datetimeFigureOut">
               <a:rPr lang="en-US" smtClean="0"/>
-              <a:t>5/21/18</a:t>
+              <a:t>5/23/18</a:t>
             </a:fld>
             <a:endParaRPr lang="en-US"/>
           </a:p>
@@ -2025,7 +2039,7 @@
           <a:p>
             <a:fld id="{2A50713F-BF44-3547-876E-CD7CBBF470C2}" type="datetimeFigureOut">
               <a:rPr lang="en-US" smtClean="0"/>
-              <a:t>5/21/18</a:t>
+              <a:t>5/23/18</a:t>
             </a:fld>
             <a:endParaRPr lang="en-US"/>
           </a:p>
@@ -2138,7 +2152,7 @@
           <a:p>
             <a:fld id="{2A50713F-BF44-3547-876E-CD7CBBF470C2}" type="datetimeFigureOut">
               <a:rPr lang="en-US" smtClean="0"/>
-              <a:t>5/21/18</a:t>
+              <a:t>5/23/18</a:t>
             </a:fld>
             <a:endParaRPr lang="en-US"/>
           </a:p>
@@ -2228,7 +2242,7 @@
           <a:p>
             <a:fld id="{2A50713F-BF44-3547-876E-CD7CBBF470C2}" type="datetimeFigureOut">
               <a:rPr lang="en-US" smtClean="0"/>
-              <a:t>5/21/18</a:t>
+              <a:t>5/23/18</a:t>
             </a:fld>
             <a:endParaRPr lang="en-US"/>
           </a:p>
@@ -2500,7 +2514,7 @@
           <a:p>
             <a:fld id="{2A50713F-BF44-3547-876E-CD7CBBF470C2}" type="datetimeFigureOut">
               <a:rPr lang="en-US" smtClean="0"/>
-              <a:t>5/21/18</a:t>
+              <a:t>5/23/18</a:t>
             </a:fld>
             <a:endParaRPr lang="en-US"/>
           </a:p>
@@ -2752,7 +2766,7 @@
           <a:p>
             <a:fld id="{2A50713F-BF44-3547-876E-CD7CBBF470C2}" type="datetimeFigureOut">
               <a:rPr lang="en-US" smtClean="0"/>
-              <a:t>5/21/18</a:t>
+              <a:t>5/23/18</a:t>
             </a:fld>
             <a:endParaRPr lang="en-US"/>
           </a:p>
@@ -2960,7 +2974,7 @@
           <a:p>
             <a:fld id="{2A50713F-BF44-3547-876E-CD7CBBF470C2}" type="datetimeFigureOut">
               <a:rPr lang="en-US" smtClean="0"/>
-              <a:t>5/21/18</a:t>
+              <a:t>5/23/18</a:t>
             </a:fld>
             <a:endParaRPr lang="en-US"/>
           </a:p>
@@ -3398,7 +3412,7 @@
         <p:spPr>
           <a:xfrm>
             <a:off x="2669540" y="1249680"/>
-            <a:ext cx="1348741" cy="461665"/>
+            <a:ext cx="1348741" cy="215444"/>
           </a:xfrm>
           <a:prstGeom prst="rect">
             <a:avLst/>
@@ -3418,7 +3432,54 @@
                 <a:ea typeface="Helvetica" charset="0"/>
                 <a:cs typeface="Helvetica" charset="0"/>
               </a:rPr>
-              <a:t>gross primary production</a:t>
+              <a:t>gross primary </a:t>
+            </a:r>
+            <a:r>
+              <a:rPr lang="en-US" sz="800" dirty="0" smtClean="0">
+                <a:latin typeface="Helvetica" charset="0"/>
+                <a:ea typeface="Helvetica" charset="0"/>
+                <a:cs typeface="Helvetica" charset="0"/>
+              </a:rPr>
+              <a:t>production</a:t>
+            </a:r>
+            <a:endParaRPr lang="en-US" sz="800" dirty="0" smtClean="0">
+              <a:latin typeface="Helvetica" charset="0"/>
+              <a:ea typeface="Helvetica" charset="0"/>
+              <a:cs typeface="Helvetica" charset="0"/>
+            </a:endParaRPr>
+          </a:p>
+        </p:txBody>
+      </p:sp>
+      <p:sp>
+        <p:nvSpPr>
+          <p:cNvPr id="14" name="TextBox 13"/>
+          <p:cNvSpPr txBox="1"/>
+          <p:nvPr/>
+        </p:nvSpPr>
+        <p:spPr>
+          <a:xfrm>
+            <a:off x="1263648" y="1785481"/>
+            <a:ext cx="737872" cy="461665"/>
+          </a:xfrm>
+          <a:prstGeom prst="rect">
+            <a:avLst/>
+          </a:prstGeom>
+          <a:noFill/>
+        </p:spPr>
+        <p:txBody>
+          <a:bodyPr wrap="square" rtlCol="0">
+            <a:spAutoFit/>
+          </a:bodyPr>
+          <a:lstStyle/>
+          <a:p>
+            <a:pPr algn="ctr"/>
+            <a:r>
+              <a:rPr lang="en-US" sz="800" dirty="0" smtClean="0">
+                <a:latin typeface="Helvetica" charset="0"/>
+                <a:ea typeface="Helvetica" charset="0"/>
+                <a:cs typeface="Helvetica" charset="0"/>
+              </a:rPr>
+              <a:t>fossil fuels</a:t>
             </a:r>
           </a:p>
           <a:p>
@@ -3437,7 +3498,7 @@
                 <a:ea typeface="Helvetica" charset="0"/>
                 <a:cs typeface="Helvetica" charset="0"/>
               </a:rPr>
-              <a:t>122</a:t>
+              <a:t>+9.4</a:t>
             </a:r>
             <a:endParaRPr lang="en-US" sz="800" b="1" dirty="0">
               <a:latin typeface="Helvetica" charset="0"/>
@@ -3449,14 +3510,14 @@
       </p:sp>
       <p:sp>
         <p:nvSpPr>
-          <p:cNvPr id="10" name="TextBox 9"/>
+          <p:cNvPr id="15" name="TextBox 14"/>
           <p:cNvSpPr txBox="1"/>
           <p:nvPr/>
         </p:nvSpPr>
         <p:spPr>
           <a:xfrm>
-            <a:off x="2669540" y="1985238"/>
-            <a:ext cx="325120" cy="215444"/>
+            <a:off x="4338793" y="1063758"/>
+            <a:ext cx="1637665" cy="215444"/>
           </a:xfrm>
           <a:prstGeom prst="rect">
             <a:avLst/>
@@ -3469,219 +3530,22 @@
           </a:bodyPr>
           <a:lstStyle/>
           <a:p>
-            <a:r>
-              <a:rPr lang="en-US" sz="800" b="1" dirty="0" smtClean="0">
-                <a:latin typeface="Helvetica" charset="0"/>
-                <a:ea typeface="Helvetica" charset="0"/>
-                <a:cs typeface="Helvetica" charset="0"/>
-              </a:rPr>
-              <a:t>63</a:t>
-            </a:r>
-            <a:endParaRPr lang="en-US" sz="800" b="1" dirty="0">
-              <a:latin typeface="Helvetica" charset="0"/>
-              <a:ea typeface="Helvetica" charset="0"/>
-              <a:cs typeface="Helvetica" charset="0"/>
-            </a:endParaRPr>
-          </a:p>
-        </p:txBody>
-      </p:sp>
-      <p:sp>
-        <p:nvSpPr>
-          <p:cNvPr id="11" name="TextBox 10"/>
-          <p:cNvSpPr txBox="1"/>
-          <p:nvPr/>
-        </p:nvSpPr>
-        <p:spPr>
-          <a:xfrm>
-            <a:off x="3683000" y="1985238"/>
-            <a:ext cx="335280" cy="215444"/>
-          </a:xfrm>
-          <a:prstGeom prst="rect">
-            <a:avLst/>
-          </a:prstGeom>
-          <a:noFill/>
-        </p:spPr>
-        <p:txBody>
-          <a:bodyPr wrap="square" rtlCol="0">
-            <a:spAutoFit/>
-          </a:bodyPr>
-          <a:lstStyle/>
-          <a:p>
-            <a:r>
-              <a:rPr lang="en-US" sz="800" b="1" dirty="0" smtClean="0">
-                <a:latin typeface="Helvetica" charset="0"/>
-                <a:ea typeface="Helvetica" charset="0"/>
-                <a:cs typeface="Helvetica" charset="0"/>
-              </a:rPr>
-              <a:t>41</a:t>
-            </a:r>
-            <a:endParaRPr lang="en-US" sz="800" b="1" dirty="0">
-              <a:latin typeface="Helvetica" charset="0"/>
-              <a:ea typeface="Helvetica" charset="0"/>
-              <a:cs typeface="Helvetica" charset="0"/>
-            </a:endParaRPr>
-          </a:p>
-        </p:txBody>
-      </p:sp>
-      <p:sp>
-        <p:nvSpPr>
-          <p:cNvPr id="12" name="TextBox 11"/>
-          <p:cNvSpPr txBox="1"/>
-          <p:nvPr/>
-        </p:nvSpPr>
-        <p:spPr>
-          <a:xfrm>
-            <a:off x="3362960" y="1985238"/>
-            <a:ext cx="335280" cy="215444"/>
-          </a:xfrm>
-          <a:prstGeom prst="rect">
-            <a:avLst/>
-          </a:prstGeom>
-          <a:noFill/>
-        </p:spPr>
-        <p:txBody>
-          <a:bodyPr wrap="square" rtlCol="0">
-            <a:spAutoFit/>
-          </a:bodyPr>
-          <a:lstStyle/>
-          <a:p>
-            <a:r>
-              <a:rPr lang="en-US" sz="800" b="1" smtClean="0">
-                <a:latin typeface="Helvetica" charset="0"/>
-                <a:ea typeface="Helvetica" charset="0"/>
-                <a:cs typeface="Helvetica" charset="0"/>
-              </a:rPr>
-              <a:t>10</a:t>
-            </a:r>
-            <a:endParaRPr lang="en-US" sz="800" b="1" dirty="0">
-              <a:latin typeface="Helvetica" charset="0"/>
-              <a:ea typeface="Helvetica" charset="0"/>
-              <a:cs typeface="Helvetica" charset="0"/>
-            </a:endParaRPr>
-          </a:p>
-        </p:txBody>
-      </p:sp>
-      <p:sp>
-        <p:nvSpPr>
-          <p:cNvPr id="13" name="TextBox 12"/>
-          <p:cNvSpPr txBox="1"/>
-          <p:nvPr/>
-        </p:nvSpPr>
-        <p:spPr>
-          <a:xfrm>
-            <a:off x="3256280" y="1985238"/>
-            <a:ext cx="218440" cy="215444"/>
-          </a:xfrm>
-          <a:prstGeom prst="rect">
-            <a:avLst/>
-          </a:prstGeom>
-          <a:noFill/>
-        </p:spPr>
-        <p:txBody>
-          <a:bodyPr wrap="square" rtlCol="0">
-            <a:spAutoFit/>
-          </a:bodyPr>
-          <a:lstStyle/>
-          <a:p>
-            <a:r>
-              <a:rPr lang="en-US" sz="800" b="1" dirty="0" smtClean="0">
-                <a:latin typeface="Helvetica" charset="0"/>
-                <a:ea typeface="Helvetica" charset="0"/>
-                <a:cs typeface="Helvetica" charset="0"/>
-              </a:rPr>
-              <a:t>8</a:t>
-            </a:r>
-          </a:p>
-        </p:txBody>
-      </p:sp>
-      <p:sp>
-        <p:nvSpPr>
-          <p:cNvPr id="14" name="TextBox 13"/>
-          <p:cNvSpPr txBox="1"/>
-          <p:nvPr/>
-        </p:nvSpPr>
-        <p:spPr>
-          <a:xfrm>
-            <a:off x="1263648" y="1785481"/>
-            <a:ext cx="737872" cy="461665"/>
-          </a:xfrm>
-          <a:prstGeom prst="rect">
-            <a:avLst/>
-          </a:prstGeom>
-          <a:noFill/>
-        </p:spPr>
-        <p:txBody>
-          <a:bodyPr wrap="square" rtlCol="0">
-            <a:spAutoFit/>
-          </a:bodyPr>
-          <a:lstStyle/>
-          <a:p>
             <a:pPr algn="ctr"/>
             <a:r>
+              <a:rPr lang="en-US" sz="800" smtClean="0">
+                <a:latin typeface="Helvetica" charset="0"/>
+                <a:ea typeface="Helvetica" charset="0"/>
+                <a:cs typeface="Helvetica" charset="0"/>
+              </a:rPr>
+              <a:t>ecosystem respiration </a:t>
+            </a:r>
+            <a:r>
               <a:rPr lang="en-US" sz="800" dirty="0" smtClean="0">
                 <a:latin typeface="Helvetica" charset="0"/>
                 <a:ea typeface="Helvetica" charset="0"/>
                 <a:cs typeface="Helvetica" charset="0"/>
               </a:rPr>
-              <a:t>fossil fuels</a:t>
-            </a:r>
-          </a:p>
-          <a:p>
-            <a:pPr algn="ctr"/>
-            <a:endParaRPr lang="en-US" sz="800" dirty="0" smtClean="0">
-              <a:latin typeface="Helvetica" charset="0"/>
-              <a:ea typeface="Helvetica" charset="0"/>
-              <a:cs typeface="Helvetica" charset="0"/>
-            </a:endParaRPr>
-          </a:p>
-          <a:p>
-            <a:pPr algn="ctr"/>
-            <a:r>
-              <a:rPr lang="en-US" sz="800" b="1" dirty="0" smtClean="0">
-                <a:latin typeface="Helvetica" charset="0"/>
-                <a:ea typeface="Helvetica" charset="0"/>
-                <a:cs typeface="Helvetica" charset="0"/>
-              </a:rPr>
-              <a:t>+9.4</a:t>
-            </a:r>
-            <a:endParaRPr lang="en-US" sz="800" b="1" dirty="0">
-              <a:latin typeface="Helvetica" charset="0"/>
-              <a:ea typeface="Helvetica" charset="0"/>
-              <a:cs typeface="Helvetica" charset="0"/>
-            </a:endParaRPr>
-          </a:p>
-        </p:txBody>
-      </p:sp>
-      <p:sp>
-        <p:nvSpPr>
-          <p:cNvPr id="15" name="TextBox 14"/>
-          <p:cNvSpPr txBox="1"/>
-          <p:nvPr/>
-        </p:nvSpPr>
-        <p:spPr>
-          <a:xfrm>
-            <a:off x="4475479" y="1548527"/>
-            <a:ext cx="1348741" cy="215444"/>
-          </a:xfrm>
-          <a:prstGeom prst="rect">
-            <a:avLst/>
-          </a:prstGeom>
-          <a:noFill/>
-        </p:spPr>
-        <p:txBody>
-          <a:bodyPr wrap="square" rtlCol="0">
-            <a:spAutoFit/>
-          </a:bodyPr>
-          <a:lstStyle/>
-          <a:p>
-            <a:pPr algn="ctr"/>
-            <a:r>
-              <a:rPr lang="en-US" sz="800" dirty="0" smtClean="0">
-                <a:latin typeface="Helvetica" charset="0"/>
-                <a:ea typeface="Helvetica" charset="0"/>
-                <a:cs typeface="Helvetica" charset="0"/>
-              </a:rPr>
-              <a:t>respiration + fire </a:t>
+              <a:t>+ fire </a:t>
             </a:r>
             <a:endParaRPr lang="en-US" sz="800" dirty="0">
               <a:latin typeface="Helvetica" charset="0"/>
@@ -4277,7 +4141,23 @@
                 <a:ea typeface="Helvetica" charset="0"/>
                 <a:cs typeface="Helvetica" charset="0"/>
               </a:rPr>
-              <a:t>1.7</a:t>
+              <a:t>1.6 </a:t>
+            </a:r>
+            <a:r>
+              <a:rPr lang="mr-IN" sz="800" b="1" dirty="0" smtClean="0">
+                <a:latin typeface="Helvetica" charset="0"/>
+                <a:ea typeface="Helvetica" charset="0"/>
+                <a:cs typeface="Helvetica" charset="0"/>
+              </a:rPr>
+              <a:t>–</a:t>
+            </a:r>
+            <a:r>
+              <a:rPr lang="en-US" sz="800" b="1" dirty="0" smtClean="0">
+                <a:latin typeface="Helvetica" charset="0"/>
+                <a:ea typeface="Helvetica" charset="0"/>
+                <a:cs typeface="Helvetica" charset="0"/>
+              </a:rPr>
+              <a:t> 1.7</a:t>
             </a:r>
             <a:endParaRPr lang="en-US" sz="800" b="1" dirty="0">
               <a:latin typeface="Helvetica" charset="0"/>
@@ -4455,7 +4335,15 @@
                 <a:ea typeface="Helvetica" charset="0"/>
                 <a:cs typeface="Helvetica" charset="0"/>
               </a:rPr>
-              <a:t>biomass 47</a:t>
+              <a:t>biomass </a:t>
+            </a:r>
+            <a:r>
+              <a:rPr lang="en-US" sz="800" i="1" dirty="0" smtClean="0">
+                <a:latin typeface="Helvetica" charset="0"/>
+                <a:ea typeface="Helvetica" charset="0"/>
+                <a:cs typeface="Helvetica" charset="0"/>
+              </a:rPr>
+              <a:t>47-59</a:t>
             </a:r>
             <a:endParaRPr lang="en-US" sz="800" i="1" dirty="0">
               <a:latin typeface="Helvetica" charset="0"/>
@@ -4515,7 +4403,7 @@
                 <a:ea typeface="Helvetica" charset="0"/>
                 <a:cs typeface="Helvetica" charset="0"/>
               </a:rPr>
-              <a:t>262-229</a:t>
+              <a:t>211-262</a:t>
             </a:r>
             <a:endParaRPr lang="en-US" sz="800" i="1" dirty="0">
               <a:latin typeface="Helvetica" charset="0"/>
@@ -4583,7 +4471,7 @@
                 <a:ea typeface="Helvetica" charset="0"/>
                 <a:cs typeface="Helvetica" charset="0"/>
               </a:rPr>
-              <a:t>31</a:t>
+              <a:t>31-107</a:t>
             </a:r>
             <a:endParaRPr lang="en-US" sz="800" i="1" dirty="0">
               <a:latin typeface="Helvetica" charset="0"/>
@@ -4697,7 +4585,15 @@
                 <a:ea typeface="Helvetica" charset="0"/>
                 <a:cs typeface="Helvetica" charset="0"/>
               </a:rPr>
-              <a:t>biomass 54</a:t>
+              <a:t>biomass </a:t>
+            </a:r>
+            <a:r>
+              <a:rPr lang="en-US" sz="800" i="1" dirty="0" smtClean="0">
+                <a:latin typeface="Helvetica" charset="0"/>
+                <a:ea typeface="Helvetica" charset="0"/>
+                <a:cs typeface="Helvetica" charset="0"/>
+              </a:rPr>
+              <a:t>54-88</a:t>
             </a:r>
             <a:endParaRPr lang="en-US" sz="800" i="1" dirty="0">
               <a:latin typeface="Helvetica" charset="0"/>
@@ -4993,19 +4889,535 @@
             <a:pPr algn="ctr"/>
             <a:r>
               <a:rPr lang="en-US" sz="800" i="1" dirty="0" smtClean="0">
-                <a:solidFill>
-                  <a:srgbClr val="FF0000"/>
-                </a:solidFill>
-                <a:latin typeface="Helvetica" charset="0"/>
-                <a:ea typeface="Helvetica" charset="0"/>
-                <a:cs typeface="Helvetica" charset="0"/>
-              </a:rPr>
-              <a:t>~800</a:t>
+                <a:latin typeface="Helvetica" charset="0"/>
+                <a:ea typeface="Helvetica" charset="0"/>
+                <a:cs typeface="Helvetica" charset="0"/>
+              </a:rPr>
+              <a:t>873</a:t>
             </a:r>
             <a:endParaRPr lang="en-US" sz="800" i="1" dirty="0">
-              <a:solidFill>
-                <a:srgbClr val="FF0000"/>
-              </a:solidFill>
+              <a:latin typeface="Helvetica" charset="0"/>
+              <a:ea typeface="Helvetica" charset="0"/>
+              <a:cs typeface="Helvetica" charset="0"/>
+            </a:endParaRPr>
+          </a:p>
+        </p:txBody>
+      </p:sp>
+      <p:sp>
+        <p:nvSpPr>
+          <p:cNvPr id="46" name="TextBox 45"/>
+          <p:cNvSpPr txBox="1"/>
+          <p:nvPr/>
+        </p:nvSpPr>
+        <p:spPr>
+          <a:xfrm>
+            <a:off x="4021581" y="2393454"/>
+            <a:ext cx="428472" cy="215444"/>
+          </a:xfrm>
+          <a:prstGeom prst="rect">
+            <a:avLst/>
+          </a:prstGeom>
+          <a:solidFill>
+            <a:schemeClr val="bg1">
+              <a:alpha val="73000"/>
+            </a:schemeClr>
+          </a:solidFill>
+          <a:ln>
+            <a:noFill/>
+          </a:ln>
+          <a:effectLst>
+            <a:softEdge rad="50800"/>
+          </a:effectLst>
+        </p:spPr>
+        <p:txBody>
+          <a:bodyPr wrap="square" rtlCol="0">
+            <a:spAutoFit/>
+          </a:bodyPr>
+          <a:lstStyle/>
+          <a:p>
+            <a:pPr algn="ctr"/>
+            <a:r>
+              <a:rPr lang="en-US" sz="800" b="1" smtClean="0">
+                <a:latin typeface="Helvetica" charset="0"/>
+                <a:ea typeface="Helvetica" charset="0"/>
+                <a:cs typeface="Helvetica" charset="0"/>
+              </a:rPr>
+              <a:t>-40.8</a:t>
+            </a:r>
+            <a:endParaRPr lang="en-US" sz="800" b="1" dirty="0">
+              <a:latin typeface="Helvetica" charset="0"/>
+              <a:ea typeface="Helvetica" charset="0"/>
+              <a:cs typeface="Helvetica" charset="0"/>
+            </a:endParaRPr>
+          </a:p>
+        </p:txBody>
+      </p:sp>
+      <p:sp>
+        <p:nvSpPr>
+          <p:cNvPr id="47" name="TextBox 46"/>
+          <p:cNvSpPr txBox="1"/>
+          <p:nvPr/>
+        </p:nvSpPr>
+        <p:spPr>
+          <a:xfrm>
+            <a:off x="3595401" y="2743255"/>
+            <a:ext cx="482601" cy="215444"/>
+          </a:xfrm>
+          <a:prstGeom prst="rect">
+            <a:avLst/>
+          </a:prstGeom>
+          <a:solidFill>
+            <a:schemeClr val="bg1">
+              <a:alpha val="93000"/>
+            </a:schemeClr>
+          </a:solidFill>
+          <a:ln>
+            <a:noFill/>
+          </a:ln>
+          <a:effectLst>
+            <a:softEdge rad="38100"/>
+          </a:effectLst>
+        </p:spPr>
+        <p:txBody>
+          <a:bodyPr wrap="square" rtlCol="0">
+            <a:spAutoFit/>
+          </a:bodyPr>
+          <a:lstStyle/>
+          <a:p>
+            <a:pPr algn="ctr"/>
+            <a:r>
+              <a:rPr lang="en-US" sz="800" b="1" dirty="0" smtClean="0">
+                <a:latin typeface="Helvetica" charset="0"/>
+                <a:ea typeface="Helvetica" charset="0"/>
+                <a:cs typeface="Helvetica" charset="0"/>
+              </a:rPr>
+              <a:t>-9.9</a:t>
+            </a:r>
+            <a:endParaRPr lang="en-US" sz="800" b="1" dirty="0">
+              <a:latin typeface="Helvetica" charset="0"/>
+              <a:ea typeface="Helvetica" charset="0"/>
+              <a:cs typeface="Helvetica" charset="0"/>
+            </a:endParaRPr>
+          </a:p>
+        </p:txBody>
+      </p:sp>
+      <p:sp>
+        <p:nvSpPr>
+          <p:cNvPr id="48" name="TextBox 47"/>
+          <p:cNvSpPr txBox="1"/>
+          <p:nvPr/>
+        </p:nvSpPr>
+        <p:spPr>
+          <a:xfrm>
+            <a:off x="3192082" y="2608898"/>
+            <a:ext cx="459740" cy="215444"/>
+          </a:xfrm>
+          <a:prstGeom prst="rect">
+            <a:avLst/>
+          </a:prstGeom>
+          <a:solidFill>
+            <a:schemeClr val="bg1">
+              <a:alpha val="93000"/>
+            </a:schemeClr>
+          </a:solidFill>
+          <a:ln>
+            <a:noFill/>
+          </a:ln>
+          <a:effectLst>
+            <a:softEdge rad="38100"/>
+          </a:effectLst>
+        </p:spPr>
+        <p:txBody>
+          <a:bodyPr wrap="square" rtlCol="0">
+            <a:spAutoFit/>
+          </a:bodyPr>
+          <a:lstStyle/>
+          <a:p>
+            <a:pPr algn="ctr"/>
+            <a:r>
+              <a:rPr lang="en-US" sz="800" b="1" smtClean="0">
+                <a:latin typeface="Helvetica" charset="0"/>
+                <a:ea typeface="Helvetica" charset="0"/>
+                <a:cs typeface="Helvetica" charset="0"/>
+              </a:rPr>
+              <a:t>-8.3</a:t>
+            </a:r>
+            <a:endParaRPr lang="en-US" sz="800" b="1" dirty="0">
+              <a:latin typeface="Helvetica" charset="0"/>
+              <a:ea typeface="Helvetica" charset="0"/>
+              <a:cs typeface="Helvetica" charset="0"/>
+            </a:endParaRPr>
+          </a:p>
+        </p:txBody>
+      </p:sp>
+      <p:sp>
+        <p:nvSpPr>
+          <p:cNvPr id="49" name="TextBox 48"/>
+          <p:cNvSpPr txBox="1"/>
+          <p:nvPr/>
+        </p:nvSpPr>
+        <p:spPr>
+          <a:xfrm>
+            <a:off x="2411236" y="2458524"/>
+            <a:ext cx="469120" cy="215444"/>
+          </a:xfrm>
+          <a:prstGeom prst="rect">
+            <a:avLst/>
+          </a:prstGeom>
+          <a:solidFill>
+            <a:schemeClr val="bg1">
+              <a:alpha val="73000"/>
+            </a:schemeClr>
+          </a:solidFill>
+          <a:ln>
+            <a:noFill/>
+          </a:ln>
+          <a:effectLst>
+            <a:softEdge rad="50800"/>
+          </a:effectLst>
+        </p:spPr>
+        <p:txBody>
+          <a:bodyPr wrap="square" rtlCol="0">
+            <a:spAutoFit/>
+          </a:bodyPr>
+          <a:lstStyle/>
+          <a:p>
+            <a:pPr algn="ctr"/>
+            <a:r>
+              <a:rPr lang="en-US" sz="800" b="1" smtClean="0">
+                <a:latin typeface="Helvetica" charset="0"/>
+                <a:ea typeface="Helvetica" charset="0"/>
+                <a:cs typeface="Helvetica" charset="0"/>
+              </a:rPr>
+              <a:t>-62.6</a:t>
+            </a:r>
+            <a:endParaRPr lang="en-US" sz="800" b="1" dirty="0">
+              <a:latin typeface="Helvetica" charset="0"/>
+              <a:ea typeface="Helvetica" charset="0"/>
+              <a:cs typeface="Helvetica" charset="0"/>
+            </a:endParaRPr>
+          </a:p>
+        </p:txBody>
+      </p:sp>
+      <p:sp>
+        <p:nvSpPr>
+          <p:cNvPr id="50" name="TextBox 49"/>
+          <p:cNvSpPr txBox="1"/>
+          <p:nvPr/>
+        </p:nvSpPr>
+        <p:spPr>
+          <a:xfrm>
+            <a:off x="5325083" y="2089528"/>
+            <a:ext cx="482652" cy="338554"/>
+          </a:xfrm>
+          <a:prstGeom prst="rect">
+            <a:avLst/>
+          </a:prstGeom>
+          <a:solidFill>
+            <a:schemeClr val="bg1">
+              <a:alpha val="73000"/>
+            </a:schemeClr>
+          </a:solidFill>
+          <a:ln>
+            <a:noFill/>
+          </a:ln>
+          <a:effectLst>
+            <a:softEdge rad="50800"/>
+          </a:effectLst>
+        </p:spPr>
+        <p:txBody>
+          <a:bodyPr wrap="square" rtlCol="0">
+            <a:spAutoFit/>
+          </a:bodyPr>
+          <a:lstStyle/>
+          <a:p>
+            <a:pPr algn="ctr"/>
+            <a:r>
+              <a:rPr lang="en-US" sz="800" b="1" dirty="0">
+                <a:latin typeface="Helvetica" charset="0"/>
+                <a:ea typeface="Helvetica" charset="0"/>
+                <a:cs typeface="Helvetica" charset="0"/>
+              </a:rPr>
+              <a:t>+</a:t>
+            </a:r>
+            <a:r>
+              <a:rPr lang="en-US" sz="800" b="1" dirty="0" smtClean="0">
+                <a:latin typeface="Helvetica" charset="0"/>
+                <a:ea typeface="Helvetica" charset="0"/>
+                <a:cs typeface="Helvetica" charset="0"/>
+              </a:rPr>
+              <a:t>40.7-40.9</a:t>
+            </a:r>
+            <a:endParaRPr lang="en-US" sz="800" b="1" dirty="0">
+              <a:latin typeface="Helvetica" charset="0"/>
+              <a:ea typeface="Helvetica" charset="0"/>
+              <a:cs typeface="Helvetica" charset="0"/>
+            </a:endParaRPr>
+          </a:p>
+        </p:txBody>
+      </p:sp>
+      <p:sp>
+        <p:nvSpPr>
+          <p:cNvPr id="51" name="TextBox 50"/>
+          <p:cNvSpPr txBox="1"/>
+          <p:nvPr/>
+        </p:nvSpPr>
+        <p:spPr>
+          <a:xfrm>
+            <a:off x="4962835" y="2250935"/>
+            <a:ext cx="389579" cy="215444"/>
+          </a:xfrm>
+          <a:prstGeom prst="rect">
+            <a:avLst/>
+          </a:prstGeom>
+          <a:solidFill>
+            <a:schemeClr val="bg1">
+              <a:alpha val="93000"/>
+            </a:schemeClr>
+          </a:solidFill>
+          <a:ln>
+            <a:noFill/>
+          </a:ln>
+          <a:effectLst>
+            <a:softEdge rad="38100"/>
+          </a:effectLst>
+        </p:spPr>
+        <p:txBody>
+          <a:bodyPr wrap="square" rtlCol="0">
+            <a:spAutoFit/>
+          </a:bodyPr>
+          <a:lstStyle/>
+          <a:p>
+            <a:pPr algn="ctr"/>
+            <a:r>
+              <a:rPr lang="en-US" sz="800" b="1" dirty="0" smtClean="0">
+                <a:latin typeface="Helvetica" charset="0"/>
+                <a:ea typeface="Helvetica" charset="0"/>
+                <a:cs typeface="Helvetica" charset="0"/>
+              </a:rPr>
+              <a:t>+9.1</a:t>
+            </a:r>
+            <a:endParaRPr lang="en-US" sz="800" b="1" dirty="0">
+              <a:latin typeface="Helvetica" charset="0"/>
+              <a:ea typeface="Helvetica" charset="0"/>
+              <a:cs typeface="Helvetica" charset="0"/>
+            </a:endParaRPr>
+          </a:p>
+        </p:txBody>
+      </p:sp>
+      <p:sp>
+        <p:nvSpPr>
+          <p:cNvPr id="52" name="TextBox 51"/>
+          <p:cNvSpPr txBox="1"/>
+          <p:nvPr/>
+        </p:nvSpPr>
+        <p:spPr>
+          <a:xfrm>
+            <a:off x="4722354" y="2151083"/>
+            <a:ext cx="385253" cy="215444"/>
+          </a:xfrm>
+          <a:prstGeom prst="rect">
+            <a:avLst/>
+          </a:prstGeom>
+          <a:solidFill>
+            <a:schemeClr val="bg1">
+              <a:alpha val="93000"/>
+            </a:schemeClr>
+          </a:solidFill>
+          <a:ln>
+            <a:noFill/>
+          </a:ln>
+          <a:effectLst>
+            <a:softEdge rad="38100"/>
+          </a:effectLst>
+        </p:spPr>
+        <p:txBody>
+          <a:bodyPr wrap="square" rtlCol="0">
+            <a:spAutoFit/>
+          </a:bodyPr>
+          <a:lstStyle/>
+          <a:p>
+            <a:pPr algn="ctr"/>
+            <a:r>
+              <a:rPr lang="en-US" sz="800" b="1" dirty="0" smtClean="0">
+                <a:latin typeface="Helvetica" charset="0"/>
+                <a:ea typeface="Helvetica" charset="0"/>
+                <a:cs typeface="Helvetica" charset="0"/>
+              </a:rPr>
+              <a:t>+7.8</a:t>
+            </a:r>
+            <a:endParaRPr lang="en-US" sz="800" b="1" dirty="0">
+              <a:latin typeface="Helvetica" charset="0"/>
+              <a:ea typeface="Helvetica" charset="0"/>
+              <a:cs typeface="Helvetica" charset="0"/>
+            </a:endParaRPr>
+          </a:p>
+        </p:txBody>
+      </p:sp>
+      <p:sp>
+        <p:nvSpPr>
+          <p:cNvPr id="53" name="TextBox 52"/>
+          <p:cNvSpPr txBox="1"/>
+          <p:nvPr/>
+        </p:nvSpPr>
+        <p:spPr>
+          <a:xfrm>
+            <a:off x="4379645" y="1945680"/>
+            <a:ext cx="510487" cy="215444"/>
+          </a:xfrm>
+          <a:prstGeom prst="rect">
+            <a:avLst/>
+          </a:prstGeom>
+          <a:solidFill>
+            <a:schemeClr val="bg1">
+              <a:alpha val="73000"/>
+            </a:schemeClr>
+          </a:solidFill>
+          <a:ln>
+            <a:noFill/>
+          </a:ln>
+          <a:effectLst>
+            <a:softEdge rad="50800"/>
+          </a:effectLst>
+        </p:spPr>
+        <p:txBody>
+          <a:bodyPr wrap="square" rtlCol="0">
+            <a:spAutoFit/>
+          </a:bodyPr>
+          <a:lstStyle/>
+          <a:p>
+            <a:pPr algn="ctr"/>
+            <a:r>
+              <a:rPr lang="en-US" sz="800" b="1" smtClean="0">
+                <a:latin typeface="Helvetica" charset="0"/>
+                <a:ea typeface="Helvetica" charset="0"/>
+                <a:cs typeface="Helvetica" charset="0"/>
+              </a:rPr>
+              <a:t>+62.6</a:t>
+            </a:r>
+            <a:endParaRPr lang="en-US" sz="800" b="1" dirty="0">
+              <a:latin typeface="Helvetica" charset="0"/>
+              <a:ea typeface="Helvetica" charset="0"/>
+              <a:cs typeface="Helvetica" charset="0"/>
+            </a:endParaRPr>
+          </a:p>
+        </p:txBody>
+      </p:sp>
+      <p:sp>
+        <p:nvSpPr>
+          <p:cNvPr id="54" name="TextBox 53"/>
+          <p:cNvSpPr txBox="1"/>
+          <p:nvPr/>
+        </p:nvSpPr>
+        <p:spPr>
+          <a:xfrm>
+            <a:off x="4617872" y="1587136"/>
+            <a:ext cx="996632" cy="215444"/>
+          </a:xfrm>
+          <a:prstGeom prst="rect">
+            <a:avLst/>
+          </a:prstGeom>
+          <a:solidFill>
+            <a:schemeClr val="bg1">
+              <a:alpha val="73000"/>
+            </a:schemeClr>
+          </a:solidFill>
+          <a:ln>
+            <a:noFill/>
+          </a:ln>
+          <a:effectLst>
+            <a:softEdge rad="50800"/>
+          </a:effectLst>
+        </p:spPr>
+        <p:txBody>
+          <a:bodyPr wrap="square" rtlCol="0">
+            <a:spAutoFit/>
+          </a:bodyPr>
+          <a:lstStyle/>
+          <a:p>
+            <a:pPr algn="ctr"/>
+            <a:r>
+              <a:rPr lang="en-US" sz="800" b="1" dirty="0" smtClean="0">
+                <a:latin typeface="Helvetica" charset="0"/>
+                <a:ea typeface="Helvetica" charset="0"/>
+                <a:cs typeface="Helvetica" charset="0"/>
+              </a:rPr>
+              <a:t>+</a:t>
+            </a:r>
+            <a:r>
+              <a:rPr lang="en-US" sz="800" b="1" dirty="0" smtClean="0">
+                <a:latin typeface="Helvetica" charset="0"/>
+                <a:ea typeface="Helvetica" charset="0"/>
+                <a:cs typeface="Helvetica" charset="0"/>
+              </a:rPr>
+              <a:t>120.3 </a:t>
+            </a:r>
+            <a:r>
+              <a:rPr lang="mr-IN" sz="800" b="1" dirty="0" smtClean="0">
+                <a:latin typeface="Helvetica" charset="0"/>
+                <a:ea typeface="Helvetica" charset="0"/>
+                <a:cs typeface="Helvetica" charset="0"/>
+              </a:rPr>
+              <a:t>–</a:t>
+            </a:r>
+            <a:r>
+              <a:rPr lang="en-US" sz="800" b="1" dirty="0" smtClean="0">
+                <a:latin typeface="Helvetica" charset="0"/>
+                <a:ea typeface="Helvetica" charset="0"/>
+                <a:cs typeface="Helvetica" charset="0"/>
+              </a:rPr>
+              <a:t> 120.4</a:t>
+            </a:r>
+            <a:endParaRPr lang="en-US" sz="800" b="1" dirty="0">
+              <a:latin typeface="Helvetica" charset="0"/>
+              <a:ea typeface="Helvetica" charset="0"/>
+              <a:cs typeface="Helvetica" charset="0"/>
+            </a:endParaRPr>
+          </a:p>
+        </p:txBody>
+      </p:sp>
+      <p:sp>
+        <p:nvSpPr>
+          <p:cNvPr id="55" name="TextBox 54"/>
+          <p:cNvSpPr txBox="1"/>
+          <p:nvPr/>
+        </p:nvSpPr>
+        <p:spPr>
+          <a:xfrm>
+            <a:off x="3098003" y="1516118"/>
+            <a:ext cx="531657" cy="215444"/>
+          </a:xfrm>
+          <a:prstGeom prst="rect">
+            <a:avLst/>
+          </a:prstGeom>
+          <a:solidFill>
+            <a:schemeClr val="bg1">
+              <a:alpha val="73000"/>
+            </a:schemeClr>
+          </a:solidFill>
+          <a:ln>
+            <a:noFill/>
+          </a:ln>
+          <a:effectLst>
+            <a:softEdge rad="50800"/>
+          </a:effectLst>
+        </p:spPr>
+        <p:txBody>
+          <a:bodyPr wrap="square" rtlCol="0">
+            <a:spAutoFit/>
+          </a:bodyPr>
+          <a:lstStyle/>
+          <a:p>
+            <a:pPr algn="ctr"/>
+            <a:r>
+              <a:rPr lang="en-US" sz="800" b="1" smtClean="0">
+                <a:latin typeface="Helvetica" charset="0"/>
+                <a:ea typeface="Helvetica" charset="0"/>
+                <a:cs typeface="Helvetica" charset="0"/>
+              </a:rPr>
+              <a:t>-121.6</a:t>
+            </a:r>
+            <a:endParaRPr lang="en-US" sz="800" b="1" dirty="0">
               <a:latin typeface="Helvetica" charset="0"/>
               <a:ea typeface="Helvetica" charset="0"/>
               <a:cs typeface="Helvetica" charset="0"/>

</xml_diff>

<commit_message>
update C cycle diagram
Removed ranges to present only one estimate for each flux. Mostly going with Pan et al. 2011  for internal consistency.
</commit_message>
<xml_diff>
--- a/Global_C_cycle/Global C cycle diagram.pptx
+++ b/Global_C_cycle/Global C cycle diagram.pptx
@@ -197,7 +197,7 @@
           <a:p>
             <a:fld id="{477DAECC-5608-6847-9D1F-233F2AA6E8E0}" type="datetimeFigureOut">
               <a:rPr lang="en-US" smtClean="0"/>
-              <a:t>5/23/18</a:t>
+              <a:t>7/8/18</a:t>
             </a:fld>
             <a:endParaRPr lang="en-US"/>
           </a:p>
@@ -510,32 +510,186 @@
           <a:lstStyle/>
           <a:p>
             <a:r>
-              <a:rPr lang="en-US" dirty="0" smtClean="0"/>
-              <a:t>Most</a:t>
-            </a:r>
-            <a:r>
-              <a:rPr lang="en-US" baseline="0" dirty="0" smtClean="0"/>
-              <a:t> recent estimates from each </a:t>
-            </a:r>
-            <a:r>
-              <a:rPr lang="en-US" baseline="0" dirty="0" smtClean="0"/>
-              <a:t>source.</a:t>
-            </a:r>
-          </a:p>
-          <a:p>
-            <a:r>
-              <a:rPr lang="en-US" baseline="0" dirty="0" smtClean="0"/>
-              <a:t>Ecosystem respiration + fire are </a:t>
-            </a:r>
-            <a:r>
-              <a:rPr lang="en-US" baseline="0" smtClean="0"/>
-              <a:t>my calculations based </a:t>
-            </a:r>
-            <a:r>
-              <a:rPr lang="en-US" baseline="0" dirty="0" smtClean="0"/>
-              <a:t>on change estimate for each biome</a:t>
-            </a:r>
-            <a:endParaRPr lang="en-US" dirty="0"/>
+              <a:rPr lang="en-US" sz="1200" kern="1200" dirty="0" smtClean="0">
+                <a:solidFill>
+                  <a:schemeClr val="tx1"/>
+                </a:solidFill>
+                <a:effectLst/>
+                <a:latin typeface="+mn-lt"/>
+                <a:ea typeface="+mn-ea"/>
+                <a:cs typeface="+mn-cs"/>
+              </a:rPr>
+              <a:t>Values apply to the period 2000-2018. Sources include the following: biomass: IPCC 2000, </a:t>
+            </a:r>
+            <a:r>
+              <a:rPr lang="en-US" sz="1200" kern="1200" dirty="0" err="1" smtClean="0">
+                <a:solidFill>
+                  <a:schemeClr val="tx1"/>
+                </a:solidFill>
+                <a:effectLst/>
+                <a:latin typeface="+mn-lt"/>
+                <a:ea typeface="+mn-ea"/>
+                <a:cs typeface="+mn-cs"/>
+              </a:rPr>
+              <a:t>Baccini</a:t>
+            </a:r>
+            <a:r>
+              <a:rPr lang="en-US" sz="1200" kern="1200" dirty="0" smtClean="0">
+                <a:solidFill>
+                  <a:schemeClr val="tx1"/>
+                </a:solidFill>
+                <a:effectLst/>
+                <a:latin typeface="+mn-lt"/>
+                <a:ea typeface="+mn-ea"/>
+                <a:cs typeface="+mn-cs"/>
+              </a:rPr>
+              <a:t> et al 2012, Pan et al. 2013; GPP: (Beer </a:t>
+            </a:r>
+            <a:r>
+              <a:rPr lang="en-US" sz="1200" i="1" kern="1200" dirty="0" smtClean="0">
+                <a:solidFill>
+                  <a:schemeClr val="tx1"/>
+                </a:solidFill>
+                <a:effectLst/>
+                <a:latin typeface="+mn-lt"/>
+                <a:ea typeface="+mn-ea"/>
+                <a:cs typeface="+mn-cs"/>
+              </a:rPr>
+              <a:t>et al</a:t>
+            </a:r>
+            <a:r>
+              <a:rPr lang="en-US" sz="1200" kern="1200" dirty="0" smtClean="0">
+                <a:solidFill>
+                  <a:schemeClr val="tx1"/>
+                </a:solidFill>
+                <a:effectLst/>
+                <a:latin typeface="+mn-lt"/>
+                <a:ea typeface="+mn-ea"/>
+                <a:cs typeface="+mn-cs"/>
+              </a:rPr>
+              <a:t> 2010); intact forest sink: Pan et al. 2011; tropical deforestation and regrowth: Pan et al. 2011; net terrestrial sink: Pan et al. 2011; </a:t>
+            </a:r>
+            <a:r>
+              <a:rPr lang="en-US" sz="1200" kern="1200" dirty="0" err="1" smtClean="0">
+                <a:solidFill>
+                  <a:schemeClr val="tx1"/>
+                </a:solidFill>
+                <a:effectLst/>
+                <a:latin typeface="+mn-lt"/>
+                <a:ea typeface="+mn-ea"/>
+                <a:cs typeface="+mn-cs"/>
+              </a:rPr>
+              <a:t>respiration+fire</a:t>
+            </a:r>
+            <a:r>
+              <a:rPr lang="en-US" sz="1200" kern="1200" dirty="0" smtClean="0">
+                <a:solidFill>
+                  <a:schemeClr val="tx1"/>
+                </a:solidFill>
+                <a:effectLst/>
+                <a:latin typeface="+mn-lt"/>
+                <a:ea typeface="+mn-ea"/>
+                <a:cs typeface="+mn-cs"/>
+              </a:rPr>
+              <a:t>: calculated based on others; fossil fuel emissions: Le </a:t>
+            </a:r>
+            <a:r>
+              <a:rPr lang="en-US" sz="1200" kern="1200" dirty="0" err="1" smtClean="0">
+                <a:solidFill>
+                  <a:schemeClr val="tx1"/>
+                </a:solidFill>
+                <a:effectLst/>
+                <a:latin typeface="+mn-lt"/>
+                <a:ea typeface="+mn-ea"/>
+                <a:cs typeface="+mn-cs"/>
+              </a:rPr>
+              <a:t>Quere</a:t>
+            </a:r>
+            <a:r>
+              <a:rPr lang="en-US" sz="1200" kern="1200" dirty="0" smtClean="0">
+                <a:solidFill>
+                  <a:schemeClr val="tx1"/>
+                </a:solidFill>
+                <a:effectLst/>
+                <a:latin typeface="+mn-lt"/>
+                <a:ea typeface="+mn-ea"/>
+                <a:cs typeface="+mn-cs"/>
+              </a:rPr>
+              <a:t> et al 2017; atmospheric CO</a:t>
+            </a:r>
+            <a:r>
+              <a:rPr lang="en-US" sz="1200" kern="1200" baseline="-25000" dirty="0" smtClean="0">
+                <a:solidFill>
+                  <a:schemeClr val="tx1"/>
+                </a:solidFill>
+                <a:effectLst/>
+                <a:latin typeface="+mn-lt"/>
+                <a:ea typeface="+mn-ea"/>
+                <a:cs typeface="+mn-cs"/>
+              </a:rPr>
+              <a:t>2</a:t>
+            </a:r>
+            <a:r>
+              <a:rPr lang="en-US" sz="1200" kern="1200" dirty="0" smtClean="0">
+                <a:solidFill>
+                  <a:schemeClr val="tx1"/>
+                </a:solidFill>
+                <a:effectLst/>
+                <a:latin typeface="+mn-lt"/>
+                <a:ea typeface="+mn-ea"/>
+                <a:cs typeface="+mn-cs"/>
+              </a:rPr>
+              <a:t> (current; https://</a:t>
+            </a:r>
+            <a:r>
+              <a:rPr lang="en-US" sz="1200" kern="1200" dirty="0" err="1" smtClean="0">
+                <a:solidFill>
+                  <a:schemeClr val="tx1"/>
+                </a:solidFill>
+                <a:effectLst/>
+                <a:latin typeface="+mn-lt"/>
+                <a:ea typeface="+mn-ea"/>
+                <a:cs typeface="+mn-cs"/>
+              </a:rPr>
+              <a:t>scripps.ucsd.edu</a:t>
+            </a:r>
+            <a:r>
+              <a:rPr lang="en-US" sz="1200" kern="1200" dirty="0" smtClean="0">
+                <a:solidFill>
+                  <a:schemeClr val="tx1"/>
+                </a:solidFill>
+                <a:effectLst/>
+                <a:latin typeface="+mn-lt"/>
+                <a:ea typeface="+mn-ea"/>
+                <a:cs typeface="+mn-cs"/>
+              </a:rPr>
+              <a:t>/programs/</a:t>
+            </a:r>
+            <a:r>
+              <a:rPr lang="en-US" sz="1200" kern="1200" dirty="0" err="1" smtClean="0">
+                <a:solidFill>
+                  <a:schemeClr val="tx1"/>
+                </a:solidFill>
+                <a:effectLst/>
+                <a:latin typeface="+mn-lt"/>
+                <a:ea typeface="+mn-ea"/>
+                <a:cs typeface="+mn-cs"/>
+              </a:rPr>
+              <a:t>keelingcurve</a:t>
+            </a:r>
+            <a:r>
+              <a:rPr lang="en-US" sz="1200" kern="1200" smtClean="0">
+                <a:solidFill>
+                  <a:schemeClr val="tx1"/>
+                </a:solidFill>
+                <a:effectLst/>
+                <a:latin typeface="+mn-lt"/>
+                <a:ea typeface="+mn-ea"/>
+                <a:cs typeface="+mn-cs"/>
+              </a:rPr>
+              <a:t>/). </a:t>
+            </a:r>
+            <a:endParaRPr lang="en-US" baseline="0" dirty="0" smtClean="0"/>
           </a:p>
         </p:txBody>
       </p:sp>
@@ -706,7 +860,7 @@
           <a:p>
             <a:fld id="{2A50713F-BF44-3547-876E-CD7CBBF470C2}" type="datetimeFigureOut">
               <a:rPr lang="en-US" smtClean="0"/>
-              <a:t>5/23/18</a:t>
+              <a:t>7/8/18</a:t>
             </a:fld>
             <a:endParaRPr lang="en-US"/>
           </a:p>
@@ -871,7 +1025,7 @@
           <a:p>
             <a:fld id="{2A50713F-BF44-3547-876E-CD7CBBF470C2}" type="datetimeFigureOut">
               <a:rPr lang="en-US" smtClean="0"/>
-              <a:t>5/23/18</a:t>
+              <a:t>7/8/18</a:t>
             </a:fld>
             <a:endParaRPr lang="en-US"/>
           </a:p>
@@ -1046,7 +1200,7 @@
           <a:p>
             <a:fld id="{2A50713F-BF44-3547-876E-CD7CBBF470C2}" type="datetimeFigureOut">
               <a:rPr lang="en-US" smtClean="0"/>
-              <a:t>5/23/18</a:t>
+              <a:t>7/8/18</a:t>
             </a:fld>
             <a:endParaRPr lang="en-US"/>
           </a:p>
@@ -1211,7 +1365,7 @@
           <a:p>
             <a:fld id="{2A50713F-BF44-3547-876E-CD7CBBF470C2}" type="datetimeFigureOut">
               <a:rPr lang="en-US" smtClean="0"/>
-              <a:t>5/23/18</a:t>
+              <a:t>7/8/18</a:t>
             </a:fld>
             <a:endParaRPr lang="en-US"/>
           </a:p>
@@ -1450,7 +1604,7 @@
           <a:p>
             <a:fld id="{2A50713F-BF44-3547-876E-CD7CBBF470C2}" type="datetimeFigureOut">
               <a:rPr lang="en-US" smtClean="0"/>
-              <a:t>5/23/18</a:t>
+              <a:t>7/8/18</a:t>
             </a:fld>
             <a:endParaRPr lang="en-US"/>
           </a:p>
@@ -1677,7 +1831,7 @@
           <a:p>
             <a:fld id="{2A50713F-BF44-3547-876E-CD7CBBF470C2}" type="datetimeFigureOut">
               <a:rPr lang="en-US" smtClean="0"/>
-              <a:t>5/23/18</a:t>
+              <a:t>7/8/18</a:t>
             </a:fld>
             <a:endParaRPr lang="en-US"/>
           </a:p>
@@ -2039,7 +2193,7 @@
           <a:p>
             <a:fld id="{2A50713F-BF44-3547-876E-CD7CBBF470C2}" type="datetimeFigureOut">
               <a:rPr lang="en-US" smtClean="0"/>
-              <a:t>5/23/18</a:t>
+              <a:t>7/8/18</a:t>
             </a:fld>
             <a:endParaRPr lang="en-US"/>
           </a:p>
@@ -2152,7 +2306,7 @@
           <a:p>
             <a:fld id="{2A50713F-BF44-3547-876E-CD7CBBF470C2}" type="datetimeFigureOut">
               <a:rPr lang="en-US" smtClean="0"/>
-              <a:t>5/23/18</a:t>
+              <a:t>7/8/18</a:t>
             </a:fld>
             <a:endParaRPr lang="en-US"/>
           </a:p>
@@ -2242,7 +2396,7 @@
           <a:p>
             <a:fld id="{2A50713F-BF44-3547-876E-CD7CBBF470C2}" type="datetimeFigureOut">
               <a:rPr lang="en-US" smtClean="0"/>
-              <a:t>5/23/18</a:t>
+              <a:t>7/8/18</a:t>
             </a:fld>
             <a:endParaRPr lang="en-US"/>
           </a:p>
@@ -2514,7 +2668,7 @@
           <a:p>
             <a:fld id="{2A50713F-BF44-3547-876E-CD7CBBF470C2}" type="datetimeFigureOut">
               <a:rPr lang="en-US" smtClean="0"/>
-              <a:t>5/23/18</a:t>
+              <a:t>7/8/18</a:t>
             </a:fld>
             <a:endParaRPr lang="en-US"/>
           </a:p>
@@ -2766,7 +2920,7 @@
           <a:p>
             <a:fld id="{2A50713F-BF44-3547-876E-CD7CBBF470C2}" type="datetimeFigureOut">
               <a:rPr lang="en-US" smtClean="0"/>
-              <a:t>5/23/18</a:t>
+              <a:t>7/8/18</a:t>
             </a:fld>
             <a:endParaRPr lang="en-US"/>
           </a:p>
@@ -2974,7 +3128,7 @@
           <a:p>
             <a:fld id="{2A50713F-BF44-3547-876E-CD7CBBF470C2}" type="datetimeFigureOut">
               <a:rPr lang="en-US" smtClean="0"/>
-              <a:t>5/23/18</a:t>
+              <a:t>7/8/18</a:t>
             </a:fld>
             <a:endParaRPr lang="en-US"/>
           </a:p>
@@ -3432,21 +3586,8 @@
                 <a:ea typeface="Helvetica" charset="0"/>
                 <a:cs typeface="Helvetica" charset="0"/>
               </a:rPr>
-              <a:t>gross primary </a:t>
-            </a:r>
-            <a:r>
-              <a:rPr lang="en-US" sz="800" dirty="0" smtClean="0">
-                <a:latin typeface="Helvetica" charset="0"/>
-                <a:ea typeface="Helvetica" charset="0"/>
-                <a:cs typeface="Helvetica" charset="0"/>
-              </a:rPr>
-              <a:t>production</a:t>
-            </a:r>
-            <a:endParaRPr lang="en-US" sz="800" dirty="0" smtClean="0">
-              <a:latin typeface="Helvetica" charset="0"/>
-              <a:ea typeface="Helvetica" charset="0"/>
-              <a:cs typeface="Helvetica" charset="0"/>
-            </a:endParaRPr>
+              <a:t>gross primary production</a:t>
+            </a:r>
           </a:p>
         </p:txBody>
       </p:sp>
@@ -3906,7 +4047,7 @@
                 <a:ea typeface="Helvetica" charset="0"/>
                 <a:cs typeface="Helvetica" charset="0"/>
               </a:rPr>
-              <a:t>1.2 - 1.3</a:t>
+              <a:t>1.2</a:t>
             </a:r>
             <a:endParaRPr lang="en-US" sz="800" b="1" dirty="0">
               <a:latin typeface="Helvetica" charset="0"/>
@@ -3960,23 +4101,7 @@
                 <a:ea typeface="Helvetica" charset="0"/>
                 <a:cs typeface="Helvetica" charset="0"/>
               </a:rPr>
-              <a:t>1.0 </a:t>
-            </a:r>
-            <a:r>
-              <a:rPr lang="mr-IN" sz="800" b="1" dirty="0" smtClean="0">
-                <a:latin typeface="Helvetica" charset="0"/>
-                <a:ea typeface="Helvetica" charset="0"/>
-                <a:cs typeface="Helvetica" charset="0"/>
-              </a:rPr>
-              <a:t>–</a:t>
-            </a:r>
-            <a:r>
-              <a:rPr lang="en-US" sz="800" b="1" dirty="0" smtClean="0">
-                <a:latin typeface="Helvetica" charset="0"/>
-                <a:ea typeface="Helvetica" charset="0"/>
-                <a:cs typeface="Helvetica" charset="0"/>
-              </a:rPr>
-              <a:t> 1.4</a:t>
+              <a:t>1.0</a:t>
             </a:r>
             <a:endParaRPr lang="en-US" sz="800" b="1" dirty="0">
               <a:latin typeface="Helvetica" charset="0"/>
@@ -4128,36 +4253,12 @@
           <a:p>
             <a:pPr algn="ctr"/>
             <a:r>
-              <a:rPr lang="en-US" sz="800" b="1" dirty="0">
-                <a:latin typeface="Helvetica" charset="0"/>
-                <a:ea typeface="Helvetica" charset="0"/>
-                <a:cs typeface="Helvetica" charset="0"/>
-              </a:rPr>
-              <a:t>-</a:t>
-            </a:r>
-            <a:r>
               <a:rPr lang="en-US" sz="800" b="1" dirty="0" smtClean="0">
                 <a:latin typeface="Helvetica" charset="0"/>
                 <a:ea typeface="Helvetica" charset="0"/>
                 <a:cs typeface="Helvetica" charset="0"/>
               </a:rPr>
-              <a:t>1.6 </a:t>
-            </a:r>
-            <a:r>
-              <a:rPr lang="mr-IN" sz="800" b="1" dirty="0" smtClean="0">
-                <a:latin typeface="Helvetica" charset="0"/>
-                <a:ea typeface="Helvetica" charset="0"/>
-                <a:cs typeface="Helvetica" charset="0"/>
-              </a:rPr>
-              <a:t>–</a:t>
-            </a:r>
-            <a:r>
-              <a:rPr lang="en-US" sz="800" b="1" dirty="0" smtClean="0">
-                <a:latin typeface="Helvetica" charset="0"/>
-                <a:ea typeface="Helvetica" charset="0"/>
-                <a:cs typeface="Helvetica" charset="0"/>
-              </a:rPr>
-              <a:t> 1.7</a:t>
+              <a:t>-1.7</a:t>
             </a:r>
             <a:endParaRPr lang="en-US" sz="800" b="1" dirty="0">
               <a:latin typeface="Helvetica" charset="0"/>
@@ -4175,8 +4276,8 @@
         </p:nvSpPr>
         <p:spPr>
           <a:xfrm>
-            <a:off x="5566409" y="5080853"/>
-            <a:ext cx="723890" cy="461665"/>
+            <a:off x="5464809" y="5243413"/>
+            <a:ext cx="723890" cy="338554"/>
           </a:xfrm>
           <a:prstGeom prst="rect">
             <a:avLst/>
@@ -4198,23 +4299,28 @@
           <a:p>
             <a:pPr algn="ctr"/>
             <a:r>
-              <a:rPr lang="en-US" sz="800" dirty="0" smtClean="0">
+              <a:rPr lang="en-US" sz="800" smtClean="0">
                 <a:latin typeface="Helvetica" charset="0"/>
                 <a:ea typeface="Helvetica" charset="0"/>
                 <a:cs typeface="Helvetica" charset="0"/>
               </a:rPr>
-              <a:t>deforestation + degradation</a:t>
-            </a:r>
-          </a:p>
-          <a:p>
-            <a:pPr algn="ctr"/>
+              <a:t>deforestation </a:t>
+            </a:r>
+            <a:r>
+              <a:rPr lang="en-US" sz="800" b="1" smtClean="0">
+                <a:latin typeface="Helvetica" charset="0"/>
+                <a:ea typeface="Helvetica" charset="0"/>
+                <a:cs typeface="Helvetica" charset="0"/>
+              </a:rPr>
+              <a:t>+</a:t>
+            </a:r>
             <a:r>
               <a:rPr lang="en-US" sz="800" b="1" dirty="0" smtClean="0">
                 <a:latin typeface="Helvetica" charset="0"/>
                 <a:ea typeface="Helvetica" charset="0"/>
                 <a:cs typeface="Helvetica" charset="0"/>
               </a:rPr>
-              <a:t>+0.9 - 2.8</a:t>
+              <a:t>2.8</a:t>
             </a:r>
             <a:endParaRPr lang="en-US" sz="800" b="1" dirty="0">
               <a:latin typeface="Helvetica" charset="0"/>
@@ -4335,15 +4441,7 @@
                 <a:ea typeface="Helvetica" charset="0"/>
                 <a:cs typeface="Helvetica" charset="0"/>
               </a:rPr>
-              <a:t>biomass </a:t>
-            </a:r>
-            <a:r>
-              <a:rPr lang="en-US" sz="800" i="1" dirty="0" smtClean="0">
-                <a:latin typeface="Helvetica" charset="0"/>
-                <a:ea typeface="Helvetica" charset="0"/>
-                <a:cs typeface="Helvetica" charset="0"/>
-              </a:rPr>
-              <a:t>47-59</a:t>
+              <a:t>biomass 47-59</a:t>
             </a:r>
             <a:endParaRPr lang="en-US" sz="800" i="1" dirty="0">
               <a:latin typeface="Helvetica" charset="0"/>
@@ -4585,15 +4683,7 @@
                 <a:ea typeface="Helvetica" charset="0"/>
                 <a:cs typeface="Helvetica" charset="0"/>
               </a:rPr>
-              <a:t>biomass </a:t>
-            </a:r>
-            <a:r>
-              <a:rPr lang="en-US" sz="800" i="1" dirty="0" smtClean="0">
-                <a:latin typeface="Helvetica" charset="0"/>
-                <a:ea typeface="Helvetica" charset="0"/>
-                <a:cs typeface="Helvetica" charset="0"/>
-              </a:rPr>
-              <a:t>54-88</a:t>
+              <a:t>biomass 54-88</a:t>
             </a:r>
             <a:endParaRPr lang="en-US" sz="800" i="1" dirty="0">
               <a:latin typeface="Helvetica" charset="0"/>
@@ -5108,7 +5198,7 @@
         <p:spPr>
           <a:xfrm>
             <a:off x="5325083" y="2089528"/>
-            <a:ext cx="482652" cy="338554"/>
+            <a:ext cx="482652" cy="215444"/>
           </a:xfrm>
           <a:prstGeom prst="rect">
             <a:avLst/>
@@ -5133,20 +5223,12 @@
           <a:p>
             <a:pPr algn="ctr"/>
             <a:r>
-              <a:rPr lang="en-US" sz="800" b="1" dirty="0">
-                <a:latin typeface="Helvetica" charset="0"/>
-                <a:ea typeface="Helvetica" charset="0"/>
-                <a:cs typeface="Helvetica" charset="0"/>
-              </a:rPr>
-              <a:t>+</a:t>
-            </a:r>
-            <a:r>
               <a:rPr lang="en-US" sz="800" b="1" dirty="0" smtClean="0">
                 <a:latin typeface="Helvetica" charset="0"/>
                 <a:ea typeface="Helvetica" charset="0"/>
                 <a:cs typeface="Helvetica" charset="0"/>
               </a:rPr>
-              <a:t>40.7-40.9</a:t>
+              <a:t>+40.9</a:t>
             </a:r>
             <a:endParaRPr lang="en-US" sz="800" b="1" dirty="0">
               <a:latin typeface="Helvetica" charset="0"/>
@@ -5311,8 +5393,8 @@
         </p:nvSpPr>
         <p:spPr>
           <a:xfrm>
-            <a:off x="4617872" y="1587136"/>
-            <a:ext cx="996632" cy="215444"/>
+            <a:off x="4841392" y="1587136"/>
+            <a:ext cx="574838" cy="215444"/>
           </a:xfrm>
           <a:prstGeom prst="rect">
             <a:avLst/>
@@ -5342,31 +5424,7 @@
                 <a:ea typeface="Helvetica" charset="0"/>
                 <a:cs typeface="Helvetica" charset="0"/>
               </a:rPr>
-              <a:t>+</a:t>
-            </a:r>
-            <a:r>
-              <a:rPr lang="en-US" sz="800" b="1" dirty="0" smtClean="0">
-                <a:latin typeface="Helvetica" charset="0"/>
-                <a:ea typeface="Helvetica" charset="0"/>
-                <a:cs typeface="Helvetica" charset="0"/>
-              </a:rPr>
-              <a:t>120.3 </a:t>
-            </a:r>
-            <a:r>
-              <a:rPr lang="mr-IN" sz="800" b="1" dirty="0" smtClean="0">
-                <a:latin typeface="Helvetica" charset="0"/>
-                <a:ea typeface="Helvetica" charset="0"/>
-                <a:cs typeface="Helvetica" charset="0"/>
-              </a:rPr>
-              <a:t>–</a:t>
-            </a:r>
-            <a:r>
-              <a:rPr lang="en-US" sz="800" b="1" dirty="0" smtClean="0">
-                <a:latin typeface="Helvetica" charset="0"/>
-                <a:ea typeface="Helvetica" charset="0"/>
-                <a:cs typeface="Helvetica" charset="0"/>
-              </a:rPr>
-              <a:t> 120.4</a:t>
+              <a:t>+120.4</a:t>
             </a:r>
             <a:endParaRPr lang="en-US" sz="800" b="1" dirty="0">
               <a:latin typeface="Helvetica" charset="0"/>

</xml_diff>